<commit_message>
restyle toolbar and change logo
</commit_message>
<xml_diff>
--- a/src/assets/img/logo/logo.pptx
+++ b/src/assets/img/logo/logo.pptx
@@ -104,6 +104,11 @@
       </a:defRPr>
     </a:lvl9pPr>
   </p:defaultTextStyle>
+  <p:extLst>
+    <p:ext uri="{EFAFB233-063F-42B5-8137-9DF3F51BA10A}">
+      <p15:sldGuideLst xmlns:p15="http://schemas.microsoft.com/office/powerpoint/2012/main"/>
+    </p:ext>
+  </p:extLst>
 </p:presentation>
 </file>
 
@@ -256,7 +261,7 @@
           <a:p>
             <a:fld id="{5E32B476-E583-42E3-839D-8ACE7DAEB10F}" type="datetimeFigureOut">
               <a:rPr lang="de-AT" smtClean="0"/>
-              <a:t>23.11.2022</a:t>
+              <a:t>13.12.2022</a:t>
             </a:fld>
             <a:endParaRPr lang="de-AT"/>
           </a:p>
@@ -456,7 +461,7 @@
           <a:p>
             <a:fld id="{5E32B476-E583-42E3-839D-8ACE7DAEB10F}" type="datetimeFigureOut">
               <a:rPr lang="de-AT" smtClean="0"/>
-              <a:t>23.11.2022</a:t>
+              <a:t>13.12.2022</a:t>
             </a:fld>
             <a:endParaRPr lang="de-AT"/>
           </a:p>
@@ -666,7 +671,7 @@
           <a:p>
             <a:fld id="{5E32B476-E583-42E3-839D-8ACE7DAEB10F}" type="datetimeFigureOut">
               <a:rPr lang="de-AT" smtClean="0"/>
-              <a:t>23.11.2022</a:t>
+              <a:t>13.12.2022</a:t>
             </a:fld>
             <a:endParaRPr lang="de-AT"/>
           </a:p>
@@ -866,7 +871,7 @@
           <a:p>
             <a:fld id="{5E32B476-E583-42E3-839D-8ACE7DAEB10F}" type="datetimeFigureOut">
               <a:rPr lang="de-AT" smtClean="0"/>
-              <a:t>23.11.2022</a:t>
+              <a:t>13.12.2022</a:t>
             </a:fld>
             <a:endParaRPr lang="de-AT"/>
           </a:p>
@@ -1142,7 +1147,7 @@
           <a:p>
             <a:fld id="{5E32B476-E583-42E3-839D-8ACE7DAEB10F}" type="datetimeFigureOut">
               <a:rPr lang="de-AT" smtClean="0"/>
-              <a:t>23.11.2022</a:t>
+              <a:t>13.12.2022</a:t>
             </a:fld>
             <a:endParaRPr lang="de-AT"/>
           </a:p>
@@ -1410,7 +1415,7 @@
           <a:p>
             <a:fld id="{5E32B476-E583-42E3-839D-8ACE7DAEB10F}" type="datetimeFigureOut">
               <a:rPr lang="de-AT" smtClean="0"/>
-              <a:t>23.11.2022</a:t>
+              <a:t>13.12.2022</a:t>
             </a:fld>
             <a:endParaRPr lang="de-AT"/>
           </a:p>
@@ -1825,7 +1830,7 @@
           <a:p>
             <a:fld id="{5E32B476-E583-42E3-839D-8ACE7DAEB10F}" type="datetimeFigureOut">
               <a:rPr lang="de-AT" smtClean="0"/>
-              <a:t>23.11.2022</a:t>
+              <a:t>13.12.2022</a:t>
             </a:fld>
             <a:endParaRPr lang="de-AT"/>
           </a:p>
@@ -1967,7 +1972,7 @@
           <a:p>
             <a:fld id="{5E32B476-E583-42E3-839D-8ACE7DAEB10F}" type="datetimeFigureOut">
               <a:rPr lang="de-AT" smtClean="0"/>
-              <a:t>23.11.2022</a:t>
+              <a:t>13.12.2022</a:t>
             </a:fld>
             <a:endParaRPr lang="de-AT"/>
           </a:p>
@@ -2080,7 +2085,7 @@
           <a:p>
             <a:fld id="{5E32B476-E583-42E3-839D-8ACE7DAEB10F}" type="datetimeFigureOut">
               <a:rPr lang="de-AT" smtClean="0"/>
-              <a:t>23.11.2022</a:t>
+              <a:t>13.12.2022</a:t>
             </a:fld>
             <a:endParaRPr lang="de-AT"/>
           </a:p>
@@ -2393,7 +2398,7 @@
           <a:p>
             <a:fld id="{5E32B476-E583-42E3-839D-8ACE7DAEB10F}" type="datetimeFigureOut">
               <a:rPr lang="de-AT" smtClean="0"/>
-              <a:t>23.11.2022</a:t>
+              <a:t>13.12.2022</a:t>
             </a:fld>
             <a:endParaRPr lang="de-AT"/>
           </a:p>
@@ -2682,7 +2687,7 @@
           <a:p>
             <a:fld id="{5E32B476-E583-42E3-839D-8ACE7DAEB10F}" type="datetimeFigureOut">
               <a:rPr lang="de-AT" smtClean="0"/>
-              <a:t>23.11.2022</a:t>
+              <a:t>13.12.2022</a:t>
             </a:fld>
             <a:endParaRPr lang="de-AT"/>
           </a:p>
@@ -2925,7 +2930,7 @@
           <a:p>
             <a:fld id="{5E32B476-E583-42E3-839D-8ACE7DAEB10F}" type="datetimeFigureOut">
               <a:rPr lang="de-AT" smtClean="0"/>
-              <a:t>23.11.2022</a:t>
+              <a:t>13.12.2022</a:t>
             </a:fld>
             <a:endParaRPr lang="de-AT"/>
           </a:p>
@@ -3397,16 +3402,16 @@
               <a:t>                  </a:t>
             </a:r>
             <a:r>
-              <a:rPr lang="de-AT" sz="6000" dirty="0">
+              <a:rPr lang="de-AT" sz="6000" b="1" dirty="0">
                 <a:solidFill>
-                  <a:srgbClr val="3F51B5"/>
+                  <a:srgbClr val="363F50"/>
                 </a:solidFill>
               </a:rPr>
               <a:t>Simple CRM</a:t>
             </a:r>
-            <a:endParaRPr lang="de-AT" dirty="0">
+            <a:endParaRPr lang="de-AT" b="1" dirty="0">
               <a:solidFill>
-                <a:srgbClr val="3F51B5"/>
+                <a:srgbClr val="363F50"/>
               </a:solidFill>
             </a:endParaRPr>
           </a:p>
@@ -3443,7 +3448,7 @@
         </p:blipFill>
         <p:spPr>
           <a:xfrm>
-            <a:off x="2955401" y="2470579"/>
+            <a:off x="2955401" y="2424859"/>
             <a:ext cx="2178301" cy="2178301"/>
           </a:xfrm>
           <a:prstGeom prst="rect">

</xml_diff>